<commit_message>
Starting slides in Week6
</commit_message>
<xml_diff>
--- a/Week6/Slides/DSE 200X_ MiniProjectPresentation-Eleahy.pptx
+++ b/Week6/Slides/DSE 200X_ MiniProjectPresentation-Eleahy.pptx
@@ -5,7 +5,7 @@
     <p:sldMasterId id="2147483659" r:id="rId1"/>
   </p:sldMasterIdLst>
   <p:notesMasterIdLst>
-    <p:notesMasterId r:id="rId9"/>
+    <p:notesMasterId r:id="rId10"/>
   </p:notesMasterIdLst>
   <p:sldIdLst>
     <p:sldId id="256" r:id="rId2"/>
@@ -13,8 +13,9 @@
     <p:sldId id="258" r:id="rId4"/>
     <p:sldId id="259" r:id="rId5"/>
     <p:sldId id="260" r:id="rId6"/>
-    <p:sldId id="261" r:id="rId7"/>
-    <p:sldId id="262" r:id="rId8"/>
+    <p:sldId id="263" r:id="rId7"/>
+    <p:sldId id="261" r:id="rId8"/>
+    <p:sldId id="262" r:id="rId9"/>
   </p:sldIdLst>
   <p:sldSz cx="9144000" cy="5143500" type="screen16x9"/>
   <p:notesSz cx="6858000" cy="9144000"/>
@@ -247,6 +248,11 @@
       </a:defRPr>
     </a:lvl9pPr>
   </p:defaultTextStyle>
+  <p:extLst>
+    <p:ext uri="{EFAFB233-063F-42B5-8137-9DF3F51BA10A}">
+      <p15:sldGuideLst xmlns:p15="http://schemas.microsoft.com/office/powerpoint/2012/main"/>
+    </p:ext>
+  </p:extLst>
 </p:presentation>
 </file>
 
@@ -1032,7 +1038,7 @@
         </p:nvSpPr>
         <p:spPr>
           <a:xfrm>
-            <a:off x="381300" y="685800"/>
+            <a:off x="381000" y="685800"/>
             <a:ext cx="6096000" cy="3429000"/>
           </a:xfrm>
           <a:custGeom>
@@ -1136,7 +1142,7 @@
         </p:nvSpPr>
         <p:spPr>
           <a:xfrm>
-            <a:off x="381300" y="685800"/>
+            <a:off x="381000" y="685800"/>
             <a:ext cx="6096000" cy="3429000"/>
           </a:xfrm>
           <a:custGeom>
@@ -6491,6 +6497,10 @@
               </a:spcAft>
               <a:buNone/>
             </a:pPr>
+            <a:r>
+              <a:rPr lang="en-US" dirty="0"/>
+              <a:t>In the soccer world, the English Premier League is often said to be the best soccer league to watch in terms of quality. I have heard this all my life, while wondering if this was true. I have watched many soccer games from many countries, and have found that other leagues are just as exciting to watch, if not more exciting. I wanted to find out what the data showed. </a:t>
+            </a:r>
             <a:endParaRPr dirty="0"/>
           </a:p>
         </p:txBody>
@@ -6597,8 +6607,8 @@
               <a:buNone/>
             </a:pPr>
             <a:r>
-              <a:rPr lang="en" dirty="0"/>
-              <a:t>What is your research question you aim to answer using the dataset?  Be sure the research question is well defined (see project description for details).</a:t>
+              <a:rPr lang="en-US" dirty="0"/>
+              <a:t>Is the English Premier League (EPL) the most exciting soccer league in the world to watch, in terms of goals per game?</a:t>
             </a:r>
             <a:endParaRPr dirty="0"/>
           </a:p>
@@ -6654,20 +6664,24 @@
           </a:bodyPr>
           <a:lstStyle/>
           <a:p>
-            <a:pPr marL="0" lvl="0" indent="0" algn="l" rtl="0">
-              <a:spcBef>
-                <a:spcPts val="0"/>
-              </a:spcBef>
-              <a:spcAft>
-                <a:spcPts val="0"/>
-              </a:spcAft>
-              <a:buNone/>
-            </a:pPr>
+            <a:pPr lvl="0"/>
             <a:r>
-              <a:rPr lang="en"/>
-              <a:t>Findings</a:t>
+              <a:rPr lang="en" dirty="0"/>
+              <a:t>Findings –</a:t>
             </a:r>
-            <a:endParaRPr/>
+            <a:r>
+              <a:rPr lang="en-US" dirty="0"/>
+              <a:t>Goals Per Game</a:t>
+            </a:r>
+            <a:r>
+              <a:rPr lang="en" dirty="0"/>
+              <a:t>(1) </a:t>
+            </a:r>
+            <a:r>
+              <a:rPr lang="en-US" dirty="0"/>
+              <a:t>	</a:t>
+            </a:r>
+            <a:endParaRPr dirty="0"/>
           </a:p>
         </p:txBody>
       </p:sp>
@@ -6706,45 +6720,84 @@
               <a:buNone/>
             </a:pPr>
             <a:r>
-              <a:rPr lang="en"/>
-              <a:t>&lt;Feel free to replicate this slide to show multiple findings&gt;</a:t>
+              <a:rPr lang="en-US" dirty="0"/>
+              <a:t>The results of grouping the dataset by country gave the following results for number of goas per game average: </a:t>
             </a:r>
-            <a:endParaRPr/>
           </a:p>
           <a:p>
             <a:pPr marL="0" lvl="0" indent="0" algn="l" rtl="0">
               <a:spcBef>
-                <a:spcPts val="1600"/>
+                <a:spcPts val="0"/>
               </a:spcBef>
               <a:spcAft>
                 <a:spcPts val="0"/>
               </a:spcAft>
               <a:buNone/>
             </a:pPr>
-            <a:r>
-              <a:rPr lang="en"/>
-              <a:t>Present your findings.  Include at least one visualization in your presentation (feel free to include more). The visualization should be honest, accessible, and elegant for a general audience.</a:t>
-            </a:r>
-            <a:endParaRPr/>
-          </a:p>
-          <a:p>
-            <a:pPr marL="0" lvl="0" indent="0" algn="l" rtl="0">
-              <a:spcBef>
-                <a:spcPts val="1600"/>
-              </a:spcBef>
-              <a:spcAft>
-                <a:spcPts val="1600"/>
-              </a:spcAft>
-              <a:buNone/>
-            </a:pPr>
-            <a:r>
-              <a:rPr lang="en"/>
-              <a:t>You need not come to a definitive conclusion, but you need to say how your findings relate back to your research question.</a:t>
-            </a:r>
-            <a:endParaRPr/>
+            <a:endParaRPr dirty="0"/>
           </a:p>
         </p:txBody>
       </p:sp>
+      <p:pic>
+        <p:nvPicPr>
+          <p:cNvPr id="2" name="Picture 1">
+            <a:extLst>
+              <a:ext uri="{FF2B5EF4-FFF2-40B4-BE49-F238E27FC236}">
+                <a16:creationId xmlns:a16="http://schemas.microsoft.com/office/drawing/2014/main" id="{01A37711-CC18-4265-8994-F843802DC0F0}"/>
+              </a:ext>
+            </a:extLst>
+          </p:cNvPr>
+          <p:cNvPicPr>
+            <a:picLocks noChangeAspect="1"/>
+          </p:cNvPicPr>
+          <p:nvPr/>
+        </p:nvPicPr>
+        <p:blipFill>
+          <a:blip r:embed="rId3"/>
+          <a:stretch>
+            <a:fillRect/>
+          </a:stretch>
+        </p:blipFill>
+        <p:spPr>
+          <a:xfrm>
+            <a:off x="311700" y="1881962"/>
+            <a:ext cx="2989874" cy="3112681"/>
+          </a:xfrm>
+          <a:prstGeom prst="rect">
+            <a:avLst/>
+          </a:prstGeom>
+        </p:spPr>
+      </p:pic>
+      <p:pic>
+        <p:nvPicPr>
+          <p:cNvPr id="3" name="Picture 2">
+            <a:extLst>
+              <a:ext uri="{FF2B5EF4-FFF2-40B4-BE49-F238E27FC236}">
+                <a16:creationId xmlns:a16="http://schemas.microsoft.com/office/drawing/2014/main" id="{E7A46973-4978-44C6-A628-E5C238EF158A}"/>
+              </a:ext>
+            </a:extLst>
+          </p:cNvPr>
+          <p:cNvPicPr>
+            <a:picLocks noChangeAspect="1"/>
+          </p:cNvPicPr>
+          <p:nvPr/>
+        </p:nvPicPr>
+        <p:blipFill>
+          <a:blip r:embed="rId4"/>
+          <a:stretch>
+            <a:fillRect/>
+          </a:stretch>
+        </p:blipFill>
+        <p:spPr>
+          <a:xfrm>
+            <a:off x="3888686" y="1881962"/>
+            <a:ext cx="3907484" cy="2896928"/>
+          </a:xfrm>
+          <a:prstGeom prst="rect">
+            <a:avLst/>
+          </a:prstGeom>
+        </p:spPr>
+      </p:pic>
     </p:spTree>
   </p:cSld>
   <p:clrMapOvr>
@@ -6754,6 +6807,101 @@
 </file>
 
 <file path=ppt/slides/slide6.xml><?xml version="1.0" encoding="utf-8"?>
+<p:sld xmlns:a="http://schemas.openxmlformats.org/drawingml/2006/main" xmlns:r="http://schemas.openxmlformats.org/officeDocument/2006/relationships" xmlns:p="http://schemas.openxmlformats.org/presentationml/2006/main">
+  <p:cSld>
+    <p:spTree>
+      <p:nvGrpSpPr>
+        <p:cNvPr id="1" name=""/>
+        <p:cNvGrpSpPr/>
+        <p:nvPr/>
+      </p:nvGrpSpPr>
+      <p:grpSpPr>
+        <a:xfrm>
+          <a:off x="0" y="0"/>
+          <a:ext cx="0" cy="0"/>
+          <a:chOff x="0" y="0"/>
+          <a:chExt cx="0" cy="0"/>
+        </a:xfrm>
+      </p:grpSpPr>
+      <p:sp>
+        <p:nvSpPr>
+          <p:cNvPr id="2" name="Title 1">
+            <a:extLst>
+              <a:ext uri="{FF2B5EF4-FFF2-40B4-BE49-F238E27FC236}">
+                <a16:creationId xmlns:a16="http://schemas.microsoft.com/office/drawing/2014/main" id="{3661F68F-FA42-44F5-9F38-DB5A5FE3DEC6}"/>
+              </a:ext>
+            </a:extLst>
+          </p:cNvPr>
+          <p:cNvSpPr>
+            <a:spLocks noGrp="1"/>
+          </p:cNvSpPr>
+          <p:nvPr>
+            <p:ph type="title"/>
+          </p:nvPr>
+        </p:nvSpPr>
+        <p:spPr/>
+        <p:txBody>
+          <a:bodyPr/>
+          <a:lstStyle/>
+          <a:p>
+            <a:r>
+              <a:rPr lang="en" dirty="0"/>
+              <a:t>Findings –</a:t>
+            </a:r>
+            <a:r>
+              <a:rPr lang="en-US" dirty="0"/>
+              <a:t>Goals Per Game</a:t>
+            </a:r>
+            <a:r>
+              <a:rPr lang="en" dirty="0"/>
+              <a:t>(1)</a:t>
+            </a:r>
+            <a:endParaRPr lang="en-US" dirty="0"/>
+          </a:p>
+        </p:txBody>
+      </p:sp>
+      <p:sp>
+        <p:nvSpPr>
+          <p:cNvPr id="3" name="Text Placeholder 2">
+            <a:extLst>
+              <a:ext uri="{FF2B5EF4-FFF2-40B4-BE49-F238E27FC236}">
+                <a16:creationId xmlns:a16="http://schemas.microsoft.com/office/drawing/2014/main" id="{4DB0A7CF-B038-4EF0-B3A5-2D3470A04DBA}"/>
+              </a:ext>
+            </a:extLst>
+          </p:cNvPr>
+          <p:cNvSpPr>
+            <a:spLocks noGrp="1"/>
+          </p:cNvSpPr>
+          <p:nvPr>
+            <p:ph type="body" idx="1"/>
+          </p:nvPr>
+        </p:nvSpPr>
+        <p:spPr/>
+        <p:txBody>
+          <a:bodyPr/>
+          <a:lstStyle/>
+          <a:p>
+            <a:pPr marL="114300" indent="0">
+              <a:buNone/>
+            </a:pPr>
+            <a:endParaRPr lang="en-US"/>
+          </a:p>
+        </p:txBody>
+      </p:sp>
+    </p:spTree>
+    <p:extLst>
+      <p:ext uri="{BB962C8B-B14F-4D97-AF65-F5344CB8AC3E}">
+        <p14:creationId xmlns:p14="http://schemas.microsoft.com/office/powerpoint/2010/main" val="567210536"/>
+      </p:ext>
+    </p:extLst>
+  </p:cSld>
+  <p:clrMapOvr>
+    <a:masterClrMapping/>
+  </p:clrMapOvr>
+</p:sld>
+</file>
+
+<file path=ppt/slides/slide7.xml><?xml version="1.0" encoding="utf-8"?>
 <p:sld xmlns:a="http://schemas.openxmlformats.org/drawingml/2006/main" xmlns:r="http://schemas.openxmlformats.org/officeDocument/2006/relationships" xmlns:p="http://schemas.openxmlformats.org/presentationml/2006/main">
   <p:cSld>
     <p:spTree>
@@ -6878,7 +7026,7 @@
 </p:sld>
 </file>
 
-<file path=ppt/slides/slide7.xml><?xml version="1.0" encoding="utf-8"?>
+<file path=ppt/slides/slide8.xml><?xml version="1.0" encoding="utf-8"?>
 <p:sld xmlns:a="http://schemas.openxmlformats.org/drawingml/2006/main" xmlns:r="http://schemas.openxmlformats.org/officeDocument/2006/relationships" xmlns:p="http://schemas.openxmlformats.org/presentationml/2006/main">
   <p:cSld>
     <p:spTree>

</xml_diff>

<commit_message>
Commit before starting MC
</commit_message>
<xml_diff>
--- a/Week6/Slides/DSE 200X_ MiniProjectPresentation-Eleahy.pptx
+++ b/Week6/Slides/DSE 200X_ MiniProjectPresentation-Eleahy.pptx
@@ -5,17 +5,21 @@
     <p:sldMasterId id="2147483659" r:id="rId1"/>
   </p:sldMasterIdLst>
   <p:notesMasterIdLst>
-    <p:notesMasterId r:id="rId10"/>
+    <p:notesMasterId r:id="rId14"/>
   </p:notesMasterIdLst>
   <p:sldIdLst>
     <p:sldId id="256" r:id="rId2"/>
     <p:sldId id="257" r:id="rId3"/>
     <p:sldId id="258" r:id="rId4"/>
     <p:sldId id="259" r:id="rId5"/>
-    <p:sldId id="260" r:id="rId6"/>
-    <p:sldId id="263" r:id="rId7"/>
-    <p:sldId id="261" r:id="rId8"/>
-    <p:sldId id="262" r:id="rId9"/>
+    <p:sldId id="267" r:id="rId6"/>
+    <p:sldId id="260" r:id="rId7"/>
+    <p:sldId id="263" r:id="rId8"/>
+    <p:sldId id="264" r:id="rId9"/>
+    <p:sldId id="265" r:id="rId10"/>
+    <p:sldId id="266" r:id="rId11"/>
+    <p:sldId id="261" r:id="rId12"/>
+    <p:sldId id="262" r:id="rId13"/>
   </p:sldIdLst>
   <p:sldSz cx="9144000" cy="5143500" type="screen16x9"/>
   <p:notesSz cx="6858000" cy="9144000"/>
@@ -1246,7 +1250,7 @@
         </p:nvSpPr>
         <p:spPr>
           <a:xfrm>
-            <a:off x="381300" y="685800"/>
+            <a:off x="381000" y="685800"/>
             <a:ext cx="6096000" cy="3429000"/>
           </a:xfrm>
           <a:custGeom>
@@ -1350,7 +1354,7 @@
         </p:nvSpPr>
         <p:spPr>
           <a:xfrm>
-            <a:off x="381300" y="685800"/>
+            <a:off x="381000" y="685800"/>
             <a:ext cx="6096000" cy="3429000"/>
           </a:xfrm>
           <a:custGeom>
@@ -6283,6 +6287,415 @@
 </p:sld>
 </file>
 
+<file path=ppt/slides/slide10.xml><?xml version="1.0" encoding="utf-8"?>
+<p:sld xmlns:a="http://schemas.openxmlformats.org/drawingml/2006/main" xmlns:r="http://schemas.openxmlformats.org/officeDocument/2006/relationships" xmlns:p="http://schemas.openxmlformats.org/presentationml/2006/main">
+  <p:cSld>
+    <p:spTree>
+      <p:nvGrpSpPr>
+        <p:cNvPr id="1" name=""/>
+        <p:cNvGrpSpPr/>
+        <p:nvPr/>
+      </p:nvGrpSpPr>
+      <p:grpSpPr>
+        <a:xfrm>
+          <a:off x="0" y="0"/>
+          <a:ext cx="0" cy="0"/>
+          <a:chOff x="0" y="0"/>
+          <a:chExt cx="0" cy="0"/>
+        </a:xfrm>
+      </p:grpSpPr>
+      <p:sp>
+        <p:nvSpPr>
+          <p:cNvPr id="2" name="Title 1">
+            <a:extLst>
+              <a:ext uri="{FF2B5EF4-FFF2-40B4-BE49-F238E27FC236}">
+                <a16:creationId xmlns:a16="http://schemas.microsoft.com/office/drawing/2014/main" id="{FA583BB1-2A89-4D8D-9EED-25EB5233C2BE}"/>
+              </a:ext>
+            </a:extLst>
+          </p:cNvPr>
+          <p:cNvSpPr>
+            <a:spLocks noGrp="1"/>
+          </p:cNvSpPr>
+          <p:nvPr>
+            <p:ph type="title"/>
+          </p:nvPr>
+        </p:nvSpPr>
+        <p:spPr/>
+        <p:txBody>
+          <a:bodyPr/>
+          <a:lstStyle/>
+          <a:p>
+            <a:r>
+              <a:rPr lang="en-US" dirty="0"/>
+              <a:t>Findings  - Conclusions	</a:t>
+            </a:r>
+          </a:p>
+        </p:txBody>
+      </p:sp>
+      <p:sp>
+        <p:nvSpPr>
+          <p:cNvPr id="3" name="Text Placeholder 2">
+            <a:extLst>
+              <a:ext uri="{FF2B5EF4-FFF2-40B4-BE49-F238E27FC236}">
+                <a16:creationId xmlns:a16="http://schemas.microsoft.com/office/drawing/2014/main" id="{3971823B-62D9-4B28-A66F-5D3DA65EB2E2}"/>
+              </a:ext>
+            </a:extLst>
+          </p:cNvPr>
+          <p:cNvSpPr>
+            <a:spLocks noGrp="1"/>
+          </p:cNvSpPr>
+          <p:nvPr>
+            <p:ph type="body" idx="1"/>
+          </p:nvPr>
+        </p:nvSpPr>
+        <p:spPr/>
+        <p:txBody>
+          <a:bodyPr/>
+          <a:lstStyle/>
+          <a:p>
+            <a:pPr marL="114300" indent="0">
+              <a:buNone/>
+            </a:pPr>
+            <a:r>
+              <a:rPr lang="en-US" dirty="0"/>
+              <a:t>To conclude the results of the findings, it is clear that England is not a stand-alone country in terms of goals per game and overall goals. </a:t>
+            </a:r>
+          </a:p>
+          <a:p>
+            <a:pPr marL="114300" indent="0">
+              <a:buNone/>
+            </a:pPr>
+            <a:endParaRPr lang="en-US" dirty="0"/>
+          </a:p>
+          <a:p>
+            <a:pPr marL="114300" indent="0">
+              <a:buNone/>
+            </a:pPr>
+            <a:r>
+              <a:rPr lang="en-US" dirty="0"/>
+              <a:t>The statement that England has the best soccer games would depend heavily on how you define a good soccer game. In terms of average goals per game, England does not have the best soccer games. In terms of total goals, it is tied with France and Spain. </a:t>
+            </a:r>
+          </a:p>
+          <a:p>
+            <a:pPr marL="114300" indent="0">
+              <a:buNone/>
+            </a:pPr>
+            <a:endParaRPr lang="en-US" dirty="0"/>
+          </a:p>
+        </p:txBody>
+      </p:sp>
+    </p:spTree>
+    <p:extLst>
+      <p:ext uri="{BB962C8B-B14F-4D97-AF65-F5344CB8AC3E}">
+        <p14:creationId xmlns:p14="http://schemas.microsoft.com/office/powerpoint/2010/main" val="3358537017"/>
+      </p:ext>
+    </p:extLst>
+  </p:cSld>
+  <p:clrMapOvr>
+    <a:masterClrMapping/>
+  </p:clrMapOvr>
+</p:sld>
+</file>
+
+<file path=ppt/slides/slide11.xml><?xml version="1.0" encoding="utf-8"?>
+<p:sld xmlns:a="http://schemas.openxmlformats.org/drawingml/2006/main" xmlns:r="http://schemas.openxmlformats.org/officeDocument/2006/relationships" xmlns:p="http://schemas.openxmlformats.org/presentationml/2006/main">
+  <p:cSld>
+    <p:spTree>
+      <p:nvGrpSpPr>
+        <p:cNvPr id="1" name="Shape 84"/>
+        <p:cNvGrpSpPr/>
+        <p:nvPr/>
+      </p:nvGrpSpPr>
+      <p:grpSpPr>
+        <a:xfrm>
+          <a:off x="0" y="0"/>
+          <a:ext cx="0" cy="0"/>
+          <a:chOff x="0" y="0"/>
+          <a:chExt cx="0" cy="0"/>
+        </a:xfrm>
+      </p:grpSpPr>
+      <p:sp>
+        <p:nvSpPr>
+          <p:cNvPr id="85" name="Google Shape;85;p18"/>
+          <p:cNvSpPr txBox="1">
+            <a:spLocks noGrp="1"/>
+          </p:cNvSpPr>
+          <p:nvPr>
+            <p:ph type="title"/>
+          </p:nvPr>
+        </p:nvSpPr>
+        <p:spPr>
+          <a:xfrm>
+            <a:off x="311700" y="445025"/>
+            <a:ext cx="8520600" cy="572700"/>
+          </a:xfrm>
+          <a:prstGeom prst="rect">
+            <a:avLst/>
+          </a:prstGeom>
+        </p:spPr>
+        <p:txBody>
+          <a:bodyPr spcFirstLastPara="1" wrap="square" lIns="91425" tIns="91425" rIns="91425" bIns="91425" anchor="t" anchorCtr="0">
+            <a:noAutofit/>
+          </a:bodyPr>
+          <a:lstStyle/>
+          <a:p>
+            <a:pPr marL="0" lvl="0" indent="0" algn="l" rtl="0">
+              <a:spcBef>
+                <a:spcPts val="0"/>
+              </a:spcBef>
+              <a:spcAft>
+                <a:spcPts val="0"/>
+              </a:spcAft>
+              <a:buNone/>
+            </a:pPr>
+            <a:r>
+              <a:rPr lang="en"/>
+              <a:t>Acknowledgements</a:t>
+            </a:r>
+            <a:endParaRPr/>
+          </a:p>
+        </p:txBody>
+      </p:sp>
+      <p:sp>
+        <p:nvSpPr>
+          <p:cNvPr id="86" name="Google Shape;86;p18"/>
+          <p:cNvSpPr txBox="1">
+            <a:spLocks noGrp="1"/>
+          </p:cNvSpPr>
+          <p:nvPr>
+            <p:ph type="body" idx="1"/>
+          </p:nvPr>
+        </p:nvSpPr>
+        <p:spPr>
+          <a:xfrm>
+            <a:off x="311700" y="1152475"/>
+            <a:ext cx="8520600" cy="3416400"/>
+          </a:xfrm>
+          <a:prstGeom prst="rect">
+            <a:avLst/>
+          </a:prstGeom>
+        </p:spPr>
+        <p:txBody>
+          <a:bodyPr spcFirstLastPara="1" wrap="square" lIns="91425" tIns="91425" rIns="91425" bIns="91425" anchor="t" anchorCtr="0">
+            <a:noAutofit/>
+          </a:bodyPr>
+          <a:lstStyle/>
+          <a:p>
+            <a:pPr marL="0" lvl="0" indent="0" algn="l" rtl="0">
+              <a:spcBef>
+                <a:spcPts val="0"/>
+              </a:spcBef>
+              <a:spcAft>
+                <a:spcPts val="0"/>
+              </a:spcAft>
+              <a:buNone/>
+            </a:pPr>
+            <a:r>
+              <a:rPr lang="en-US" dirty="0"/>
+              <a:t>This project was limited by the dataset used. Ranking soccer by countries in terms of Goals per game and Total goals is not a complete story of the quality of soccer. Many other factors influence the quality of the game, and many of these factors are subjective. This project was chosen to have a small scope for simplicity. </a:t>
+            </a:r>
+          </a:p>
+          <a:p>
+            <a:pPr marL="0" lvl="0" indent="0" algn="l" rtl="0">
+              <a:spcBef>
+                <a:spcPts val="0"/>
+              </a:spcBef>
+              <a:spcAft>
+                <a:spcPts val="0"/>
+              </a:spcAft>
+              <a:buNone/>
+            </a:pPr>
+            <a:endParaRPr lang="en-US" dirty="0"/>
+          </a:p>
+          <a:p>
+            <a:pPr marL="0" lvl="0" indent="0" algn="l" rtl="0">
+              <a:spcBef>
+                <a:spcPts val="0"/>
+              </a:spcBef>
+              <a:spcAft>
+                <a:spcPts val="0"/>
+              </a:spcAft>
+              <a:buNone/>
+            </a:pPr>
+            <a:endParaRPr dirty="0"/>
+          </a:p>
+        </p:txBody>
+      </p:sp>
+    </p:spTree>
+  </p:cSld>
+  <p:clrMapOvr>
+    <a:masterClrMapping/>
+  </p:clrMapOvr>
+</p:sld>
+</file>
+
+<file path=ppt/slides/slide12.xml><?xml version="1.0" encoding="utf-8"?>
+<p:sld xmlns:a="http://schemas.openxmlformats.org/drawingml/2006/main" xmlns:r="http://schemas.openxmlformats.org/officeDocument/2006/relationships" xmlns:p="http://schemas.openxmlformats.org/presentationml/2006/main">
+  <p:cSld>
+    <p:spTree>
+      <p:nvGrpSpPr>
+        <p:cNvPr id="1" name="Shape 90"/>
+        <p:cNvGrpSpPr/>
+        <p:nvPr/>
+      </p:nvGrpSpPr>
+      <p:grpSpPr>
+        <a:xfrm>
+          <a:off x="0" y="0"/>
+          <a:ext cx="0" cy="0"/>
+          <a:chOff x="0" y="0"/>
+          <a:chExt cx="0" cy="0"/>
+        </a:xfrm>
+      </p:grpSpPr>
+      <p:sp>
+        <p:nvSpPr>
+          <p:cNvPr id="91" name="Google Shape;91;p19"/>
+          <p:cNvSpPr txBox="1">
+            <a:spLocks noGrp="1"/>
+          </p:cNvSpPr>
+          <p:nvPr>
+            <p:ph type="title"/>
+          </p:nvPr>
+        </p:nvSpPr>
+        <p:spPr>
+          <a:xfrm>
+            <a:off x="311700" y="445025"/>
+            <a:ext cx="8520600" cy="572700"/>
+          </a:xfrm>
+          <a:prstGeom prst="rect">
+            <a:avLst/>
+          </a:prstGeom>
+        </p:spPr>
+        <p:txBody>
+          <a:bodyPr spcFirstLastPara="1" wrap="square" lIns="91425" tIns="91425" rIns="91425" bIns="91425" anchor="t" anchorCtr="0">
+            <a:noAutofit/>
+          </a:bodyPr>
+          <a:lstStyle/>
+          <a:p>
+            <a:pPr marL="0" lvl="0" indent="0" algn="l" rtl="0">
+              <a:spcBef>
+                <a:spcPts val="0"/>
+              </a:spcBef>
+              <a:spcAft>
+                <a:spcPts val="0"/>
+              </a:spcAft>
+              <a:buNone/>
+            </a:pPr>
+            <a:r>
+              <a:rPr lang="en"/>
+              <a:t>References</a:t>
+            </a:r>
+            <a:endParaRPr/>
+          </a:p>
+        </p:txBody>
+      </p:sp>
+      <p:sp>
+        <p:nvSpPr>
+          <p:cNvPr id="92" name="Google Shape;92;p19"/>
+          <p:cNvSpPr txBox="1">
+            <a:spLocks noGrp="1"/>
+          </p:cNvSpPr>
+          <p:nvPr>
+            <p:ph type="body" idx="1"/>
+          </p:nvPr>
+        </p:nvSpPr>
+        <p:spPr>
+          <a:xfrm>
+            <a:off x="311700" y="1152475"/>
+            <a:ext cx="8520600" cy="3416400"/>
+          </a:xfrm>
+          <a:prstGeom prst="rect">
+            <a:avLst/>
+          </a:prstGeom>
+        </p:spPr>
+        <p:txBody>
+          <a:bodyPr spcFirstLastPara="1" wrap="square" lIns="91425" tIns="91425" rIns="91425" bIns="91425" anchor="t" anchorCtr="0">
+            <a:noAutofit/>
+          </a:bodyPr>
+          <a:lstStyle/>
+          <a:p>
+            <a:pPr marL="0" lvl="0" indent="0" algn="l" rtl="0">
+              <a:spcBef>
+                <a:spcPts val="0"/>
+              </a:spcBef>
+              <a:spcAft>
+                <a:spcPts val="1600"/>
+              </a:spcAft>
+              <a:buNone/>
+            </a:pPr>
+            <a:r>
+              <a:rPr lang="en-US" dirty="0"/>
+              <a:t>I used the bleacher report article to gain some knowledge on how to rank games: </a:t>
+            </a:r>
+          </a:p>
+          <a:p>
+            <a:pPr marL="0" lvl="0" indent="0">
+              <a:spcAft>
+                <a:spcPts val="1600"/>
+              </a:spcAft>
+              <a:buNone/>
+            </a:pPr>
+            <a:r>
+              <a:rPr lang="en-US" dirty="0">
+                <a:hlinkClick r:id="rId3"/>
+              </a:rPr>
+              <a:t>https://bleacherreport.com/articles/1922780-statistically-ranking-the-worlds-top-10-football-leagues#slide0</a:t>
+            </a:r>
+            <a:endParaRPr lang="en-US" dirty="0"/>
+          </a:p>
+          <a:p>
+            <a:pPr marL="0" lvl="0" indent="0">
+              <a:spcAft>
+                <a:spcPts val="1600"/>
+              </a:spcAft>
+              <a:buNone/>
+            </a:pPr>
+            <a:r>
+              <a:rPr lang="en-US" dirty="0"/>
+              <a:t>I extensively used </a:t>
+            </a:r>
+            <a:r>
+              <a:rPr lang="en-US" dirty="0" err="1"/>
+              <a:t>Edx’s</a:t>
+            </a:r>
+            <a:r>
+              <a:rPr lang="en-US" dirty="0"/>
+              <a:t> Python for Data Science course reference material: </a:t>
+            </a:r>
+          </a:p>
+          <a:p>
+            <a:pPr marL="0" lvl="0" indent="0">
+              <a:spcAft>
+                <a:spcPts val="1600"/>
+              </a:spcAft>
+              <a:buNone/>
+            </a:pPr>
+            <a:r>
+              <a:rPr lang="en-US" dirty="0">
+                <a:hlinkClick r:id="rId4"/>
+              </a:rPr>
+              <a:t>https://courses.edx.org/courses/course-v1:UCSanDiegoX+DSE200x+3T2019/course/</a:t>
+            </a:r>
+            <a:endParaRPr lang="en-US" dirty="0"/>
+          </a:p>
+          <a:p>
+            <a:pPr marL="0" lvl="0" indent="0">
+              <a:spcAft>
+                <a:spcPts val="1600"/>
+              </a:spcAft>
+              <a:buNone/>
+            </a:pPr>
+            <a:endParaRPr lang="en-US" dirty="0"/>
+          </a:p>
+        </p:txBody>
+      </p:sp>
+    </p:spTree>
+  </p:cSld>
+  <p:clrMapOvr>
+    <a:masterClrMapping/>
+  </p:clrMapOvr>
+</p:sld>
+</file>
+
 <file path=ppt/slides/slide2.xml><?xml version="1.0" encoding="utf-8"?>
 <p:sld xmlns:a="http://schemas.openxmlformats.org/drawingml/2006/main" xmlns:r="http://schemas.openxmlformats.org/officeDocument/2006/relationships" xmlns:p="http://schemas.openxmlformats.org/presentationml/2006/main">
   <p:cSld>
@@ -6608,7 +7021,7 @@
             </a:pPr>
             <a:r>
               <a:rPr lang="en-US" dirty="0"/>
-              <a:t>Is the English Premier League (EPL) the most exciting soccer league in the world to watch, in terms of goals per game?</a:t>
+              <a:t>Is England the most exciting soccer country in the world, in terms of goals per game and goals per country?</a:t>
             </a:r>
             <a:endParaRPr dirty="0"/>
           </a:p>
@@ -6623,6 +7036,156 @@
 </file>
 
 <file path=ppt/slides/slide5.xml><?xml version="1.0" encoding="utf-8"?>
+<p:sld xmlns:a="http://schemas.openxmlformats.org/drawingml/2006/main" xmlns:r="http://schemas.openxmlformats.org/officeDocument/2006/relationships" xmlns:p="http://schemas.openxmlformats.org/presentationml/2006/main">
+  <p:cSld>
+    <p:spTree>
+      <p:nvGrpSpPr>
+        <p:cNvPr id="1" name=""/>
+        <p:cNvGrpSpPr/>
+        <p:nvPr/>
+      </p:nvGrpSpPr>
+      <p:grpSpPr>
+        <a:xfrm>
+          <a:off x="0" y="0"/>
+          <a:ext cx="0" cy="0"/>
+          <a:chOff x="0" y="0"/>
+          <a:chExt cx="0" cy="0"/>
+        </a:xfrm>
+      </p:grpSpPr>
+      <p:sp>
+        <p:nvSpPr>
+          <p:cNvPr id="2" name="Title 1">
+            <a:extLst>
+              <a:ext uri="{FF2B5EF4-FFF2-40B4-BE49-F238E27FC236}">
+                <a16:creationId xmlns:a16="http://schemas.microsoft.com/office/drawing/2014/main" id="{874E2547-03E8-4884-8AA4-5E2E35FE397F}"/>
+              </a:ext>
+            </a:extLst>
+          </p:cNvPr>
+          <p:cNvSpPr>
+            <a:spLocks noGrp="1"/>
+          </p:cNvSpPr>
+          <p:nvPr>
+            <p:ph type="title"/>
+          </p:nvPr>
+        </p:nvSpPr>
+        <p:spPr/>
+        <p:txBody>
+          <a:bodyPr/>
+          <a:lstStyle/>
+          <a:p>
+            <a:r>
+              <a:rPr lang="en-US" dirty="0"/>
+              <a:t>Methodology	</a:t>
+            </a:r>
+          </a:p>
+        </p:txBody>
+      </p:sp>
+      <p:sp>
+        <p:nvSpPr>
+          <p:cNvPr id="3" name="Text Placeholder 2">
+            <a:extLst>
+              <a:ext uri="{FF2B5EF4-FFF2-40B4-BE49-F238E27FC236}">
+                <a16:creationId xmlns:a16="http://schemas.microsoft.com/office/drawing/2014/main" id="{EB169F81-1C11-4FC6-BE72-BD7CE5BAAE63}"/>
+              </a:ext>
+            </a:extLst>
+          </p:cNvPr>
+          <p:cNvSpPr>
+            <a:spLocks noGrp="1"/>
+          </p:cNvSpPr>
+          <p:nvPr>
+            <p:ph type="body" idx="1"/>
+          </p:nvPr>
+        </p:nvSpPr>
+        <p:spPr/>
+        <p:txBody>
+          <a:bodyPr/>
+          <a:lstStyle/>
+          <a:p>
+            <a:pPr marL="114300" indent="0">
+              <a:buNone/>
+            </a:pPr>
+            <a:r>
+              <a:rPr lang="en-US" dirty="0"/>
+              <a:t>By using a combination of techniques taught in the Python for Data Science course, I was able to manipulate the dataset to show the relevant statistics to the research question. </a:t>
+            </a:r>
+          </a:p>
+          <a:p>
+            <a:pPr marL="114300" indent="0">
+              <a:buNone/>
+            </a:pPr>
+            <a:endParaRPr lang="en-US" dirty="0"/>
+          </a:p>
+          <a:p>
+            <a:pPr marL="114300" indent="0">
+              <a:buNone/>
+            </a:pPr>
+            <a:r>
+              <a:rPr lang="en-US" dirty="0"/>
+              <a:t>The following are </a:t>
+            </a:r>
+            <a:r>
+              <a:rPr lang="en-US" u="sng" dirty="0"/>
+              <a:t>some</a:t>
+            </a:r>
+            <a:r>
+              <a:rPr lang="en-US" dirty="0"/>
+              <a:t> of the techniques used: </a:t>
+            </a:r>
+          </a:p>
+          <a:p>
+            <a:r>
+              <a:rPr lang="en-US" dirty="0"/>
+              <a:t>SQL querying </a:t>
+            </a:r>
+          </a:p>
+          <a:p>
+            <a:r>
+              <a:rPr lang="en-US" dirty="0" err="1"/>
+              <a:t>DataFrame</a:t>
+            </a:r>
+            <a:r>
+              <a:rPr lang="en-US" dirty="0"/>
+              <a:t> Filtering</a:t>
+            </a:r>
+          </a:p>
+          <a:p>
+            <a:r>
+              <a:rPr lang="en-US" dirty="0" err="1"/>
+              <a:t>DataFrame</a:t>
+            </a:r>
+            <a:r>
+              <a:rPr lang="en-US" dirty="0"/>
+              <a:t> merging</a:t>
+            </a:r>
+          </a:p>
+          <a:p>
+            <a:r>
+              <a:rPr lang="en-US" dirty="0"/>
+              <a:t>Matplotlib graphing</a:t>
+            </a:r>
+          </a:p>
+          <a:p>
+            <a:pPr marL="114300" indent="0">
+              <a:buNone/>
+            </a:pPr>
+            <a:endParaRPr lang="en-US" dirty="0"/>
+          </a:p>
+        </p:txBody>
+      </p:sp>
+    </p:spTree>
+    <p:extLst>
+      <p:ext uri="{BB962C8B-B14F-4D97-AF65-F5344CB8AC3E}">
+        <p14:creationId xmlns:p14="http://schemas.microsoft.com/office/powerpoint/2010/main" val="1698055135"/>
+      </p:ext>
+    </p:extLst>
+  </p:cSld>
+  <p:clrMapOvr>
+    <a:masterClrMapping/>
+  </p:clrMapOvr>
+</p:sld>
+</file>
+
+<file path=ppt/slides/slide6.xml><?xml version="1.0" encoding="utf-8"?>
 <p:sld xmlns:a="http://schemas.openxmlformats.org/drawingml/2006/main" xmlns:r="http://schemas.openxmlformats.org/officeDocument/2006/relationships" xmlns:p="http://schemas.openxmlformats.org/presentationml/2006/main">
   <p:cSld>
     <p:spTree>
@@ -6710,18 +7273,12 @@
           </a:bodyPr>
           <a:lstStyle/>
           <a:p>
-            <a:pPr marL="0" lvl="0" indent="0" algn="l" rtl="0">
-              <a:spcBef>
-                <a:spcPts val="0"/>
-              </a:spcBef>
-              <a:spcAft>
-                <a:spcPts val="0"/>
-              </a:spcAft>
+            <a:pPr marL="0" lvl="0" indent="0">
               <a:buNone/>
             </a:pPr>
             <a:r>
               <a:rPr lang="en-US" dirty="0"/>
-              <a:t>The results of grouping the dataset by country gave the following results for number of goas per game average: </a:t>
+              <a:t>The results of grouping the dataset by country gave the following results for the average number of goas per game : </a:t>
             </a:r>
           </a:p>
           <a:p>
@@ -6798,6 +7355,58 @@
           </a:prstGeom>
         </p:spPr>
       </p:pic>
+      <p:sp>
+        <p:nvSpPr>
+          <p:cNvPr id="4" name="Rectangle 3">
+            <a:extLst>
+              <a:ext uri="{FF2B5EF4-FFF2-40B4-BE49-F238E27FC236}">
+                <a16:creationId xmlns:a16="http://schemas.microsoft.com/office/drawing/2014/main" id="{F51AC77B-01D9-4BD4-9A70-72166353763C}"/>
+              </a:ext>
+            </a:extLst>
+          </p:cNvPr>
+          <p:cNvSpPr/>
+          <p:nvPr/>
+        </p:nvSpPr>
+        <p:spPr>
+          <a:xfrm>
+            <a:off x="5116606" y="1881962"/>
+            <a:ext cx="564776" cy="2816513"/>
+          </a:xfrm>
+          <a:prstGeom prst="rect">
+            <a:avLst/>
+          </a:prstGeom>
+          <a:noFill/>
+          <a:ln>
+            <a:solidFill>
+              <a:srgbClr val="FF0000"/>
+            </a:solidFill>
+          </a:ln>
+        </p:spPr>
+        <p:style>
+          <a:lnRef idx="2">
+            <a:schemeClr val="accent1">
+              <a:shade val="50000"/>
+            </a:schemeClr>
+          </a:lnRef>
+          <a:fillRef idx="1">
+            <a:schemeClr val="accent1"/>
+          </a:fillRef>
+          <a:effectRef idx="0">
+            <a:schemeClr val="accent1"/>
+          </a:effectRef>
+          <a:fontRef idx="minor">
+            <a:schemeClr val="lt1"/>
+          </a:fontRef>
+        </p:style>
+        <p:txBody>
+          <a:bodyPr rtlCol="0" anchor="ctr"/>
+          <a:lstStyle/>
+          <a:p>
+            <a:pPr algn="ctr"/>
+            <a:endParaRPr lang="en-US"/>
+          </a:p>
+        </p:txBody>
+      </p:sp>
     </p:spTree>
   </p:cSld>
   <p:clrMapOvr>
@@ -6806,7 +7415,7 @@
 </p:sld>
 </file>
 
-<file path=ppt/slides/slide6.xml><?xml version="1.0" encoding="utf-8"?>
+<file path=ppt/slides/slide7.xml><?xml version="1.0" encoding="utf-8"?>
 <p:sld xmlns:a="http://schemas.openxmlformats.org/drawingml/2006/main" xmlns:r="http://schemas.openxmlformats.org/officeDocument/2006/relationships" xmlns:p="http://schemas.openxmlformats.org/presentationml/2006/main">
   <p:cSld>
     <p:spTree>
@@ -6846,7 +7455,7 @@
           <a:p>
             <a:r>
               <a:rPr lang="en" dirty="0"/>
-              <a:t>Findings –</a:t>
+              <a:t>Findings – </a:t>
             </a:r>
             <a:r>
               <a:rPr lang="en-US" dirty="0"/>
@@ -6854,7 +7463,7 @@
             </a:r>
             <a:r>
               <a:rPr lang="en" dirty="0"/>
-              <a:t>(1)</a:t>
+              <a:t>(2)</a:t>
             </a:r>
             <a:endParaRPr lang="en-US" dirty="0"/>
           </a:p>
@@ -6884,7 +7493,25 @@
             <a:pPr marL="114300" indent="0">
               <a:buNone/>
             </a:pPr>
-            <a:endParaRPr lang="en-US"/>
+            <a:r>
+              <a:rPr lang="en-US" dirty="0"/>
+              <a:t>As the plot in the previous slide shows, the top three countries in terms of goal average per game are: Netherlands, Switzerland, Germany. England, however, is listed as sixth. </a:t>
+            </a:r>
+          </a:p>
+          <a:p>
+            <a:pPr marL="114300" indent="0">
+              <a:buNone/>
+            </a:pPr>
+            <a:endParaRPr lang="en-US" dirty="0"/>
+          </a:p>
+          <a:p>
+            <a:pPr marL="114300" indent="0">
+              <a:buNone/>
+            </a:pPr>
+            <a:r>
+              <a:rPr lang="en-US" dirty="0"/>
+              <a:t>But looking at the table shown in the previous slide, I notice that the sum of goals scored per country might show a different story. This is explored in the following slide</a:t>
+            </a:r>
           </a:p>
         </p:txBody>
       </p:sp>
@@ -6901,12 +7528,12 @@
 </p:sld>
 </file>
 
-<file path=ppt/slides/slide7.xml><?xml version="1.0" encoding="utf-8"?>
+<file path=ppt/slides/slide8.xml><?xml version="1.0" encoding="utf-8"?>
 <p:sld xmlns:a="http://schemas.openxmlformats.org/drawingml/2006/main" xmlns:r="http://schemas.openxmlformats.org/officeDocument/2006/relationships" xmlns:p="http://schemas.openxmlformats.org/presentationml/2006/main">
   <p:cSld>
     <p:spTree>
       <p:nvGrpSpPr>
-        <p:cNvPr id="1" name="Shape 84"/>
+        <p:cNvPr id="1" name=""/>
         <p:cNvGrpSpPr/>
         <p:nvPr/>
       </p:nvGrpSpPr>
@@ -6920,105 +7547,159 @@
       </p:grpSpPr>
       <p:sp>
         <p:nvSpPr>
-          <p:cNvPr id="85" name="Google Shape;85;p18"/>
-          <p:cNvSpPr txBox="1">
+          <p:cNvPr id="2" name="Title 1">
+            <a:extLst>
+              <a:ext uri="{FF2B5EF4-FFF2-40B4-BE49-F238E27FC236}">
+                <a16:creationId xmlns:a16="http://schemas.microsoft.com/office/drawing/2014/main" id="{64E5B58D-79FB-4CD7-AE4A-2A491D1A70FB}"/>
+              </a:ext>
+            </a:extLst>
+          </p:cNvPr>
+          <p:cNvSpPr>
             <a:spLocks noGrp="1"/>
           </p:cNvSpPr>
           <p:nvPr>
             <p:ph type="title"/>
           </p:nvPr>
         </p:nvSpPr>
+        <p:spPr/>
+        <p:txBody>
+          <a:bodyPr/>
+          <a:lstStyle/>
+          <a:p>
+            <a:r>
+              <a:rPr lang="en" dirty="0"/>
+              <a:t>Findings –</a:t>
+            </a:r>
+            <a:r>
+              <a:rPr lang="en-US" dirty="0"/>
+              <a:t>Total Goals</a:t>
+            </a:r>
+            <a:r>
+              <a:rPr lang="en" dirty="0"/>
+              <a:t>(1)</a:t>
+            </a:r>
+            <a:endParaRPr lang="en-US" dirty="0"/>
+          </a:p>
+        </p:txBody>
+      </p:sp>
+      <p:pic>
+        <p:nvPicPr>
+          <p:cNvPr id="4" name="Picture 3">
+            <a:extLst>
+              <a:ext uri="{FF2B5EF4-FFF2-40B4-BE49-F238E27FC236}">
+                <a16:creationId xmlns:a16="http://schemas.microsoft.com/office/drawing/2014/main" id="{7DA6E6D4-4F3B-4BB9-8051-5DA9B0C5E6B0}"/>
+              </a:ext>
+            </a:extLst>
+          </p:cNvPr>
+          <p:cNvPicPr>
+            <a:picLocks noChangeAspect="1"/>
+          </p:cNvPicPr>
+          <p:nvPr/>
+        </p:nvPicPr>
+        <p:blipFill>
+          <a:blip r:embed="rId2"/>
+          <a:stretch>
+            <a:fillRect/>
+          </a:stretch>
+        </p:blipFill>
         <p:spPr>
           <a:xfrm>
-            <a:off x="311700" y="445025"/>
-            <a:ext cx="8520600" cy="572700"/>
+            <a:off x="233916" y="1152475"/>
+            <a:ext cx="4104168" cy="3877155"/>
           </a:xfrm>
           <a:prstGeom prst="rect">
             <a:avLst/>
           </a:prstGeom>
         </p:spPr>
-        <p:txBody>
-          <a:bodyPr spcFirstLastPara="1" wrap="square" lIns="91425" tIns="91425" rIns="91425" bIns="91425" anchor="t" anchorCtr="0">
-            <a:noAutofit/>
-          </a:bodyPr>
-          <a:lstStyle/>
-          <a:p>
-            <a:pPr marL="0" lvl="0" indent="0" algn="l" rtl="0">
-              <a:spcBef>
-                <a:spcPts val="0"/>
-              </a:spcBef>
-              <a:spcAft>
-                <a:spcPts val="0"/>
-              </a:spcAft>
-              <a:buNone/>
-            </a:pPr>
-            <a:r>
-              <a:rPr lang="en"/>
-              <a:t>Acknowledgements</a:t>
-            </a:r>
-            <a:endParaRPr/>
-          </a:p>
-        </p:txBody>
-      </p:sp>
-      <p:sp>
-        <p:nvSpPr>
-          <p:cNvPr id="86" name="Google Shape;86;p18"/>
-          <p:cNvSpPr txBox="1">
-            <a:spLocks noGrp="1"/>
-          </p:cNvSpPr>
-          <p:nvPr>
-            <p:ph type="body" idx="1"/>
-          </p:nvPr>
-        </p:nvSpPr>
+      </p:pic>
+      <p:pic>
+        <p:nvPicPr>
+          <p:cNvPr id="5" name="Picture 4">
+            <a:extLst>
+              <a:ext uri="{FF2B5EF4-FFF2-40B4-BE49-F238E27FC236}">
+                <a16:creationId xmlns:a16="http://schemas.microsoft.com/office/drawing/2014/main" id="{A114D8CD-3338-40A5-9578-DEFD80F52441}"/>
+              </a:ext>
+            </a:extLst>
+          </p:cNvPr>
+          <p:cNvPicPr>
+            <a:picLocks noChangeAspect="1"/>
+          </p:cNvPicPr>
+          <p:nvPr/>
+        </p:nvPicPr>
+        <p:blipFill>
+          <a:blip r:embed="rId3"/>
+          <a:stretch>
+            <a:fillRect/>
+          </a:stretch>
+        </p:blipFill>
         <p:spPr>
           <a:xfrm>
-            <a:off x="311700" y="1152475"/>
-            <a:ext cx="8520600" cy="3416400"/>
+            <a:off x="4726935" y="1258801"/>
+            <a:ext cx="4296751" cy="3143078"/>
           </a:xfrm>
           <a:prstGeom prst="rect">
             <a:avLst/>
           </a:prstGeom>
         </p:spPr>
+      </p:pic>
+      <p:sp>
+        <p:nvSpPr>
+          <p:cNvPr id="6" name="Rectangle 5">
+            <a:extLst>
+              <a:ext uri="{FF2B5EF4-FFF2-40B4-BE49-F238E27FC236}">
+                <a16:creationId xmlns:a16="http://schemas.microsoft.com/office/drawing/2014/main" id="{7CF79598-4FA1-4E6D-A6D2-752A243D9169}"/>
+              </a:ext>
+            </a:extLst>
+          </p:cNvPr>
+          <p:cNvSpPr/>
+          <p:nvPr/>
+        </p:nvSpPr>
+        <p:spPr>
+          <a:xfrm>
+            <a:off x="5667935" y="1152475"/>
+            <a:ext cx="477371" cy="3143078"/>
+          </a:xfrm>
+          <a:prstGeom prst="rect">
+            <a:avLst/>
+          </a:prstGeom>
+          <a:noFill/>
+          <a:ln>
+            <a:solidFill>
+              <a:srgbClr val="FF0000"/>
+            </a:solidFill>
+          </a:ln>
+        </p:spPr>
+        <p:style>
+          <a:lnRef idx="2">
+            <a:schemeClr val="accent1">
+              <a:shade val="50000"/>
+            </a:schemeClr>
+          </a:lnRef>
+          <a:fillRef idx="1">
+            <a:schemeClr val="accent1"/>
+          </a:fillRef>
+          <a:effectRef idx="0">
+            <a:schemeClr val="accent1"/>
+          </a:effectRef>
+          <a:fontRef idx="minor">
+            <a:schemeClr val="lt1"/>
+          </a:fontRef>
+        </p:style>
         <p:txBody>
-          <a:bodyPr spcFirstLastPara="1" wrap="square" lIns="91425" tIns="91425" rIns="91425" bIns="91425" anchor="t" anchorCtr="0">
-            <a:noAutofit/>
-          </a:bodyPr>
+          <a:bodyPr rtlCol="0" anchor="ctr"/>
           <a:lstStyle/>
           <a:p>
-            <a:pPr marL="0" lvl="0" indent="0" algn="l" rtl="0">
-              <a:spcBef>
-                <a:spcPts val="0"/>
-              </a:spcBef>
-              <a:spcAft>
-                <a:spcPts val="0"/>
-              </a:spcAft>
-              <a:buNone/>
-            </a:pPr>
-            <a:r>
-              <a:rPr lang="en"/>
-              <a:t>Did you use other informal analysis to inform your work?  Did you get feedback on your work by friends or colleagues? Etc.  </a:t>
-            </a:r>
-            <a:endParaRPr/>
-          </a:p>
-          <a:p>
-            <a:pPr marL="0" lvl="0" indent="0" algn="l" rtl="0">
-              <a:spcBef>
-                <a:spcPts val="1600"/>
-              </a:spcBef>
-              <a:spcAft>
-                <a:spcPts val="1600"/>
-              </a:spcAft>
-              <a:buNone/>
-            </a:pPr>
-            <a:r>
-              <a:rPr lang="en"/>
-              <a:t>If you had no one give you feedback, it’s okay to say that.</a:t>
-            </a:r>
-            <a:endParaRPr/>
+            <a:pPr algn="ctr"/>
+            <a:endParaRPr lang="en-US"/>
           </a:p>
         </p:txBody>
       </p:sp>
     </p:spTree>
+    <p:extLst>
+      <p:ext uri="{BB962C8B-B14F-4D97-AF65-F5344CB8AC3E}">
+        <p14:creationId xmlns:p14="http://schemas.microsoft.com/office/powerpoint/2010/main" val="4114151108"/>
+      </p:ext>
+    </p:extLst>
   </p:cSld>
   <p:clrMapOvr>
     <a:masterClrMapping/>
@@ -7026,12 +7707,12 @@
 </p:sld>
 </file>
 
-<file path=ppt/slides/slide8.xml><?xml version="1.0" encoding="utf-8"?>
+<file path=ppt/slides/slide9.xml><?xml version="1.0" encoding="utf-8"?>
 <p:sld xmlns:a="http://schemas.openxmlformats.org/drawingml/2006/main" xmlns:r="http://schemas.openxmlformats.org/officeDocument/2006/relationships" xmlns:p="http://schemas.openxmlformats.org/presentationml/2006/main">
   <p:cSld>
     <p:spTree>
       <p:nvGrpSpPr>
-        <p:cNvPr id="1" name="Shape 90"/>
+        <p:cNvPr id="1" name=""/>
         <p:cNvGrpSpPr/>
         <p:nvPr/>
       </p:nvGrpSpPr>
@@ -7045,89 +7726,102 @@
       </p:grpSpPr>
       <p:sp>
         <p:nvSpPr>
-          <p:cNvPr id="91" name="Google Shape;91;p19"/>
-          <p:cNvSpPr txBox="1">
+          <p:cNvPr id="2" name="Title 1">
+            <a:extLst>
+              <a:ext uri="{FF2B5EF4-FFF2-40B4-BE49-F238E27FC236}">
+                <a16:creationId xmlns:a16="http://schemas.microsoft.com/office/drawing/2014/main" id="{595E1434-3237-4F7E-AA2A-EC0032365034}"/>
+              </a:ext>
+            </a:extLst>
+          </p:cNvPr>
+          <p:cNvSpPr>
             <a:spLocks noGrp="1"/>
           </p:cNvSpPr>
           <p:nvPr>
             <p:ph type="title"/>
           </p:nvPr>
         </p:nvSpPr>
-        <p:spPr>
-          <a:xfrm>
-            <a:off x="311700" y="445025"/>
-            <a:ext cx="8520600" cy="572700"/>
-          </a:xfrm>
-          <a:prstGeom prst="rect">
-            <a:avLst/>
-          </a:prstGeom>
-        </p:spPr>
+        <p:spPr/>
         <p:txBody>
-          <a:bodyPr spcFirstLastPara="1" wrap="square" lIns="91425" tIns="91425" rIns="91425" bIns="91425" anchor="t" anchorCtr="0">
-            <a:noAutofit/>
-          </a:bodyPr>
+          <a:bodyPr/>
           <a:lstStyle/>
           <a:p>
-            <a:pPr marL="0" lvl="0" indent="0" algn="l" rtl="0">
-              <a:spcBef>
-                <a:spcPts val="0"/>
-              </a:spcBef>
-              <a:spcAft>
-                <a:spcPts val="0"/>
-              </a:spcAft>
-              <a:buNone/>
-            </a:pPr>
             <a:r>
-              <a:rPr lang="en"/>
-              <a:t>References</a:t>
+              <a:rPr lang="en" dirty="0"/>
+              <a:t>Findings –</a:t>
             </a:r>
-            <a:endParaRPr/>
+            <a:r>
+              <a:rPr lang="en-US" dirty="0"/>
+              <a:t>Total Goals</a:t>
+            </a:r>
+            <a:r>
+              <a:rPr lang="en" dirty="0"/>
+              <a:t>(2)</a:t>
+            </a:r>
+            <a:endParaRPr lang="en-US" dirty="0"/>
           </a:p>
         </p:txBody>
       </p:sp>
       <p:sp>
         <p:nvSpPr>
-          <p:cNvPr id="92" name="Google Shape;92;p19"/>
-          <p:cNvSpPr txBox="1">
+          <p:cNvPr id="3" name="Text Placeholder 2">
+            <a:extLst>
+              <a:ext uri="{FF2B5EF4-FFF2-40B4-BE49-F238E27FC236}">
+                <a16:creationId xmlns:a16="http://schemas.microsoft.com/office/drawing/2014/main" id="{001701C1-549C-4C9E-9C29-5AF5F9226565}"/>
+              </a:ext>
+            </a:extLst>
+          </p:cNvPr>
+          <p:cNvSpPr>
             <a:spLocks noGrp="1"/>
           </p:cNvSpPr>
           <p:nvPr>
             <p:ph type="body" idx="1"/>
           </p:nvPr>
         </p:nvSpPr>
-        <p:spPr>
-          <a:xfrm>
-            <a:off x="311700" y="1152475"/>
-            <a:ext cx="8520600" cy="3416400"/>
-          </a:xfrm>
-          <a:prstGeom prst="rect">
-            <a:avLst/>
-          </a:prstGeom>
-        </p:spPr>
+        <p:spPr/>
         <p:txBody>
-          <a:bodyPr spcFirstLastPara="1" wrap="square" lIns="91425" tIns="91425" rIns="91425" bIns="91425" anchor="t" anchorCtr="0">
-            <a:noAutofit/>
-          </a:bodyPr>
+          <a:bodyPr/>
           <a:lstStyle/>
           <a:p>
-            <a:pPr marL="0" lvl="0" indent="0" algn="l" rtl="0">
-              <a:spcBef>
-                <a:spcPts val="0"/>
-              </a:spcBef>
-              <a:spcAft>
-                <a:spcPts val="1600"/>
-              </a:spcAft>
+            <a:pPr marL="114300" indent="0">
               <a:buNone/>
             </a:pPr>
             <a:r>
-              <a:rPr lang="en"/>
-              <a:t>If applicable, report any references you used in your work.  For example, you may have used a research paper from X to help guide your analysis.  You should cite that work here. If you did all the work on your own, please state this.</a:t>
+              <a:rPr lang="en-US" dirty="0"/>
+              <a:t>As shown in the previous slide, the top three countries in term of total goals are: </a:t>
             </a:r>
-            <a:endParaRPr/>
+          </a:p>
+          <a:p>
+            <a:pPr marL="114300" indent="0">
+              <a:buNone/>
+            </a:pPr>
+            <a:r>
+              <a:rPr lang="en-US" dirty="0"/>
+              <a:t>England, France, and Spain. All of these countries have the same number of goals. </a:t>
+            </a:r>
+          </a:p>
+          <a:p>
+            <a:pPr marL="114300" indent="0">
+              <a:buNone/>
+            </a:pPr>
+            <a:endParaRPr lang="en-US" dirty="0"/>
+          </a:p>
+          <a:p>
+            <a:pPr marL="114300" indent="0">
+              <a:buNone/>
+            </a:pPr>
+            <a:r>
+              <a:rPr lang="en-US" dirty="0"/>
+              <a:t>As a note, Spain had the highest scoring game recorded out of the three, so this might raise their level of excitement too! </a:t>
+            </a:r>
           </a:p>
         </p:txBody>
       </p:sp>
     </p:spTree>
+    <p:extLst>
+      <p:ext uri="{BB962C8B-B14F-4D97-AF65-F5344CB8AC3E}">
+        <p14:creationId xmlns:p14="http://schemas.microsoft.com/office/powerpoint/2010/main" val="1440301319"/>
+      </p:ext>
+    </p:extLst>
   </p:cSld>
   <p:clrMapOvr>
     <a:masterClrMapping/>

</xml_diff>